<commit_message>
Wrapping up slides again
</commit_message>
<xml_diff>
--- a/slides/Lecture_11_WrappingUp.pptx
+++ b/slides/Lecture_11_WrappingUp.pptx
@@ -10,7 +10,7 @@
   <p:sldIdLst>
     <p:sldId id="256" r:id="rId2"/>
     <p:sldId id="275" r:id="rId3"/>
-    <p:sldId id="269" r:id="rId4"/>
+    <p:sldId id="277" r:id="rId4"/>
     <p:sldId id="274" r:id="rId5"/>
     <p:sldId id="273" r:id="rId6"/>
     <p:sldId id="271" r:id="rId7"/>
@@ -478,7 +478,13 @@
   <p:cSld>
     <p:spTree>
       <p:nvGrpSpPr>
-        <p:cNvPr id="1" name=""/>
+        <p:cNvPr id="1" name="">
+          <a:extLst>
+            <a:ext uri="{FF2B5EF4-FFF2-40B4-BE49-F238E27FC236}">
+              <a16:creationId xmlns:a16="http://schemas.microsoft.com/office/drawing/2014/main" id="{D2DB800B-A0A9-8CF2-51FD-3B03F4A76FC8}"/>
+            </a:ext>
+          </a:extLst>
+        </p:cNvPr>
         <p:cNvGrpSpPr/>
         <p:nvPr/>
       </p:nvGrpSpPr>
@@ -492,7 +498,13 @@
       </p:grpSpPr>
       <p:sp>
         <p:nvSpPr>
-          <p:cNvPr id="2" name="Slide Image Placeholder 1"/>
+          <p:cNvPr id="2" name="Slide Image Placeholder 1">
+            <a:extLst>
+              <a:ext uri="{FF2B5EF4-FFF2-40B4-BE49-F238E27FC236}">
+                <a16:creationId xmlns:a16="http://schemas.microsoft.com/office/drawing/2014/main" id="{CEF1B98B-44CF-4F07-DC6E-4307FEE6F960}"/>
+              </a:ext>
+            </a:extLst>
+          </p:cNvPr>
           <p:cNvSpPr>
             <a:spLocks noGrp="1" noRot="1" noChangeAspect="1"/>
           </p:cNvSpPr>
@@ -504,7 +516,13 @@
       </p:sp>
       <p:sp>
         <p:nvSpPr>
-          <p:cNvPr id="3" name="Notes Placeholder 2"/>
+          <p:cNvPr id="3" name="Notes Placeholder 2">
+            <a:extLst>
+              <a:ext uri="{FF2B5EF4-FFF2-40B4-BE49-F238E27FC236}">
+                <a16:creationId xmlns:a16="http://schemas.microsoft.com/office/drawing/2014/main" id="{BAD9FF9F-E954-EB6D-D745-B3C239FBAEF4}"/>
+              </a:ext>
+            </a:extLst>
+          </p:cNvPr>
           <p:cNvSpPr>
             <a:spLocks noGrp="1"/>
           </p:cNvSpPr>
@@ -553,7 +571,13 @@
       </p:sp>
       <p:sp>
         <p:nvSpPr>
-          <p:cNvPr id="4" name="Slide Number Placeholder 3"/>
+          <p:cNvPr id="4" name="Slide Number Placeholder 3">
+            <a:extLst>
+              <a:ext uri="{FF2B5EF4-FFF2-40B4-BE49-F238E27FC236}">
+                <a16:creationId xmlns:a16="http://schemas.microsoft.com/office/drawing/2014/main" id="{D097A223-2A53-34A8-F614-DD2797BF8729}"/>
+              </a:ext>
+            </a:extLst>
+          </p:cNvPr>
           <p:cNvSpPr>
             <a:spLocks noGrp="1"/>
           </p:cNvSpPr>
@@ -577,7 +601,7 @@
     </p:spTree>
     <p:extLst>
       <p:ext uri="{BB962C8B-B14F-4D97-AF65-F5344CB8AC3E}">
-        <p14:creationId xmlns:p14="http://schemas.microsoft.com/office/powerpoint/2010/main" val="369042797"/>
+        <p14:creationId xmlns:p14="http://schemas.microsoft.com/office/powerpoint/2010/main" val="2731731186"/>
       </p:ext>
     </p:extLst>
   </p:cSld>
@@ -3171,7 +3195,13 @@
   <p:cSld>
     <p:spTree>
       <p:nvGrpSpPr>
-        <p:cNvPr id="1" name=""/>
+        <p:cNvPr id="1" name="">
+          <a:extLst>
+            <a:ext uri="{FF2B5EF4-FFF2-40B4-BE49-F238E27FC236}">
+              <a16:creationId xmlns:a16="http://schemas.microsoft.com/office/drawing/2014/main" id="{7BC59EF1-1EC7-119D-4D0F-3E476D0AD654}"/>
+            </a:ext>
+          </a:extLst>
+        </p:cNvPr>
         <p:cNvGrpSpPr/>
         <p:nvPr/>
       </p:nvGrpSpPr>
@@ -3188,7 +3218,7 @@
           <p:cNvPr id="3" name="Title 2">
             <a:extLst>
               <a:ext uri="{FF2B5EF4-FFF2-40B4-BE49-F238E27FC236}">
-                <a16:creationId xmlns:a16="http://schemas.microsoft.com/office/drawing/2014/main" id="{390DD774-E43E-4D5C-B770-A342FB917FE2}"/>
+                <a16:creationId xmlns:a16="http://schemas.microsoft.com/office/drawing/2014/main" id="{EE4EA71F-2363-EA5C-1BB1-7008B433F724}"/>
               </a:ext>
             </a:extLst>
           </p:cNvPr>
@@ -3206,7 +3236,7 @@
           <a:p>
             <a:r>
               <a:rPr lang="en-GB" dirty="0"/>
-              <a:t>Feedback</a:t>
+              <a:t>Next steps</a:t>
             </a:r>
           </a:p>
         </p:txBody>
@@ -3216,7 +3246,7 @@
           <p:cNvPr id="2" name="Slide Number Placeholder 1">
             <a:extLst>
               <a:ext uri="{FF2B5EF4-FFF2-40B4-BE49-F238E27FC236}">
-                <a16:creationId xmlns:a16="http://schemas.microsoft.com/office/drawing/2014/main" id="{4963AE20-5DB3-4FD4-B098-05DFFA40D548}"/>
+                <a16:creationId xmlns:a16="http://schemas.microsoft.com/office/drawing/2014/main" id="{A04178E3-0B11-1B5B-2D43-2472F6FA7ACB}"/>
               </a:ext>
             </a:extLst>
           </p:cNvPr>
@@ -3245,7 +3275,7 @@
           <p:cNvPr id="5" name="Content Placeholder 2">
             <a:extLst>
               <a:ext uri="{FF2B5EF4-FFF2-40B4-BE49-F238E27FC236}">
-                <a16:creationId xmlns:a16="http://schemas.microsoft.com/office/drawing/2014/main" id="{D9E3B2D2-238B-3E49-B309-5F7A8D8652A5}"/>
+                <a16:creationId xmlns:a16="http://schemas.microsoft.com/office/drawing/2014/main" id="{EAA9D2B9-4B8F-D674-FE25-9777EC5C6A64}"/>
               </a:ext>
             </a:extLst>
           </p:cNvPr>
@@ -3269,7 +3299,7 @@
             <a:pPr indent="-214370"/>
             <a:r>
               <a:rPr lang="en-GB" dirty="0"/>
-              <a:t>Your feedback is important to us!</a:t>
+              <a:t>A certificate of attendance will be issued automatically by LSHTM’s short courses team (look out for an e-mail next week).</a:t>
             </a:r>
           </a:p>
           <a:p>
@@ -3281,6 +3311,17 @@
             <a:r>
               <a:rPr lang="en-GB" dirty="0"/>
               <a:t>Please complete the feedback form on Moodle after the course — tell us what we did well and what we could improve.</a:t>
+            </a:r>
+          </a:p>
+          <a:p>
+            <a:pPr indent="-214370"/>
+            <a:endParaRPr lang="en-GB" dirty="0"/>
+          </a:p>
+          <a:p>
+            <a:pPr indent="-214370"/>
+            <a:r>
+              <a:rPr lang="en-GB" dirty="0"/>
+              <a:t>Feel free to contact us if you have any questions on the course material or about your modelling work!</a:t>
             </a:r>
           </a:p>
           <a:p>
@@ -3292,7 +3333,7 @@
     </p:spTree>
     <p:extLst>
       <p:ext uri="{BB962C8B-B14F-4D97-AF65-F5344CB8AC3E}">
-        <p14:creationId xmlns:p14="http://schemas.microsoft.com/office/powerpoint/2010/main" val="492800716"/>
+        <p14:creationId xmlns:p14="http://schemas.microsoft.com/office/powerpoint/2010/main" val="691474529"/>
       </p:ext>
     </p:extLst>
   </p:cSld>
@@ -3344,7 +3385,7 @@
           <a:p>
             <a:r>
               <a:rPr lang="en-US" dirty="0"/>
-              <a:t>Further resources</a:t>
+              <a:t>Recommended textbooks</a:t>
             </a:r>
           </a:p>
         </p:txBody>
@@ -3685,7 +3726,7 @@
           <a:p>
             <a:r>
               <a:rPr lang="en-US" dirty="0"/>
-              <a:t>Which models will we see in the course?</a:t>
+              <a:t>Which models did we see in the course?</a:t>
             </a:r>
           </a:p>
         </p:txBody>

</xml_diff>